<commit_message>
tdf#146756 unit test font: substitute Carlito for Calibri font
I first substituted the theme font with Liberation Sans,
but with those font metrics the label looked OK.

So I tested with Carlito, which is metric-compatible with Calibri,
and indeed it did give the same numbers both for the broken state
and for the fixed state.

Change-Id: I65c29443d6a867ef70a344eaddea6852b953f6fa
Reviewed-on: https://gerrit.libreoffice.org/c/core/+/168497
Reviewed-by: Justin Luth <jluth@mail.com>
Tested-by: Jenkins
</commit_message>
<xml_diff>
--- a/chart2/qa/extras/data/pptx/tdf146756_bestFit.pptx
+++ b/chart2/qa/extras/data/pptx/tdf146756_bestFit.pptx
@@ -4783,7 +4783,7 @@
         <a:font script="Geor" typeface="Sylfaen"/>
       </a:majorFont>
       <a:minorFont>
-        <a:latin typeface="Calibri" panose="020F0502020204030204"/>
+        <a:latin typeface="Carlito" panose="020F0502020204030204"/>
         <a:ea typeface=""/>
         <a:cs typeface=""/>
         <a:font script="Jpan" typeface="游ゴシック"/>
@@ -5009,7 +5009,7 @@
     </a:clrScheme>
     <a:fontScheme name="Office">
       <a:majorFont>
-        <a:latin typeface="Calibri"/>
+        <a:latin typeface="Carlito"/>
         <a:ea typeface=""/>
         <a:cs typeface=""/>
         <a:font script="Jpan" typeface="ＭＳ Ｐゴシック"/>
@@ -5043,7 +5043,7 @@
         <a:font script="Uigh" typeface="Microsoft Uighur"/>
       </a:majorFont>
       <a:minorFont>
-        <a:latin typeface="Calibri"/>
+        <a:latin typeface="Carlito"/>
         <a:ea typeface=""/>
         <a:cs typeface=""/>
         <a:font script="Jpan" typeface="ＭＳ Ｐゴシック"/>
@@ -5327,7 +5327,7 @@
     </a:clrScheme>
     <a:fontScheme name="Office">
       <a:majorFont>
-        <a:latin typeface="Calibri"/>
+        <a:latin typeface="Carlito"/>
         <a:ea typeface=""/>
         <a:cs typeface=""/>
         <a:font script="Jpan" typeface="ＭＳ Ｐゴシック"/>
@@ -5361,7 +5361,7 @@
         <a:font script="Uigh" typeface="Microsoft Uighur"/>
       </a:majorFont>
       <a:minorFont>
-        <a:latin typeface="Calibri"/>
+        <a:latin typeface="Carlito"/>
         <a:ea typeface=""/>
         <a:cs typeface=""/>
         <a:font script="Jpan" typeface="ＭＳ Ｐゴシック"/>

</xml_diff>